<commit_message>
definiere eine eigene farbe für die canvas-selection; setzte die farbe der data_vew-selektion auch auf die footer um
</commit_message>
<xml_diff>
--- a/dev/mapper.pptx
+++ b/dev/mapper.pptx
@@ -104,6 +104,11 @@
       </a:defRPr>
     </a:lvl9pPr>
   </p:defaultTextStyle>
+  <p:extLst>
+    <p:ext uri="{EFAFB233-063F-42B5-8137-9DF3F51BA10A}">
+      <p15:sldGuideLst xmlns:p15="http://schemas.microsoft.com/office/powerpoint/2012/main"/>
+    </p:ext>
+  </p:extLst>
 </p:presentation>
 </file>
 
@@ -3016,7 +3021,7 @@
         </p:nvSpPr>
         <p:spPr>
           <a:xfrm>
-            <a:off x="1326292" y="2879123"/>
+            <a:off x="1326292" y="2195386"/>
             <a:ext cx="4053016" cy="1050328"/>
           </a:xfrm>
           <a:prstGeom prst="rect">

</xml_diff>